<commit_message>
Added Timer for physician view
</commit_message>
<xml_diff>
--- a/BennyChan/Kinect Block Diagram and Display Feedback Flowchart.pptx
+++ b/BennyChan/Kinect Block Diagram and Display Feedback Flowchart.pptx
@@ -5,11 +5,13 @@
     <p:sldMasterId id="2147483648" r:id="rId1"/>
   </p:sldMasterIdLst>
   <p:notesMasterIdLst>
-    <p:notesMasterId r:id="rId4"/>
+    <p:notesMasterId r:id="rId6"/>
   </p:notesMasterIdLst>
   <p:sldIdLst>
     <p:sldId id="256" r:id="rId2"/>
-    <p:sldId id="258" r:id="rId3"/>
+    <p:sldId id="260" r:id="rId3"/>
+    <p:sldId id="258" r:id="rId4"/>
+    <p:sldId id="259" r:id="rId5"/>
   </p:sldIdLst>
   <p:sldSz cx="12192000" cy="6858000"/>
   <p:notesSz cx="6858000" cy="9144000"/>
@@ -198,7 +200,7 @@
           <a:p>
             <a:fld id="{C4975860-743F-4EC7-A052-1D4991B8B613}" type="datetimeFigureOut">
               <a:rPr lang="en-US" smtClean="0"/>
-              <a:t>4/30/16</a:t>
+              <a:t>9/18/16</a:t>
             </a:fld>
             <a:endParaRPr lang="en-US"/>
           </a:p>
@@ -681,7 +683,7 @@
           <a:p>
             <a:fld id="{1DBA729F-FDA9-7448-91B8-071AA2C3EF62}" type="datetimeFigureOut">
               <a:rPr lang="en-US" smtClean="0"/>
-              <a:t>4/30/16</a:t>
+              <a:t>9/18/16</a:t>
             </a:fld>
             <a:endParaRPr lang="en-US"/>
           </a:p>
@@ -851,7 +853,7 @@
           <a:p>
             <a:fld id="{1DBA729F-FDA9-7448-91B8-071AA2C3EF62}" type="datetimeFigureOut">
               <a:rPr lang="en-US" smtClean="0"/>
-              <a:t>4/30/16</a:t>
+              <a:t>9/18/16</a:t>
             </a:fld>
             <a:endParaRPr lang="en-US"/>
           </a:p>
@@ -1031,7 +1033,7 @@
           <a:p>
             <a:fld id="{1DBA729F-FDA9-7448-91B8-071AA2C3EF62}" type="datetimeFigureOut">
               <a:rPr lang="en-US" smtClean="0"/>
-              <a:t>4/30/16</a:t>
+              <a:t>9/18/16</a:t>
             </a:fld>
             <a:endParaRPr lang="en-US"/>
           </a:p>
@@ -1201,7 +1203,7 @@
           <a:p>
             <a:fld id="{1DBA729F-FDA9-7448-91B8-071AA2C3EF62}" type="datetimeFigureOut">
               <a:rPr lang="en-US" smtClean="0"/>
-              <a:t>4/30/16</a:t>
+              <a:t>9/18/16</a:t>
             </a:fld>
             <a:endParaRPr lang="en-US"/>
           </a:p>
@@ -1447,7 +1449,7 @@
           <a:p>
             <a:fld id="{1DBA729F-FDA9-7448-91B8-071AA2C3EF62}" type="datetimeFigureOut">
               <a:rPr lang="en-US" smtClean="0"/>
-              <a:t>4/30/16</a:t>
+              <a:t>9/18/16</a:t>
             </a:fld>
             <a:endParaRPr lang="en-US"/>
           </a:p>
@@ -1679,7 +1681,7 @@
           <a:p>
             <a:fld id="{1DBA729F-FDA9-7448-91B8-071AA2C3EF62}" type="datetimeFigureOut">
               <a:rPr lang="en-US" smtClean="0"/>
-              <a:t>4/30/16</a:t>
+              <a:t>9/18/16</a:t>
             </a:fld>
             <a:endParaRPr lang="en-US"/>
           </a:p>
@@ -2046,7 +2048,7 @@
           <a:p>
             <a:fld id="{1DBA729F-FDA9-7448-91B8-071AA2C3EF62}" type="datetimeFigureOut">
               <a:rPr lang="en-US" smtClean="0"/>
-              <a:t>4/30/16</a:t>
+              <a:t>9/18/16</a:t>
             </a:fld>
             <a:endParaRPr lang="en-US"/>
           </a:p>
@@ -2164,7 +2166,7 @@
           <a:p>
             <a:fld id="{1DBA729F-FDA9-7448-91B8-071AA2C3EF62}" type="datetimeFigureOut">
               <a:rPr lang="en-US" smtClean="0"/>
-              <a:t>4/30/16</a:t>
+              <a:t>9/18/16</a:t>
             </a:fld>
             <a:endParaRPr lang="en-US"/>
           </a:p>
@@ -2259,7 +2261,7 @@
           <a:p>
             <a:fld id="{1DBA729F-FDA9-7448-91B8-071AA2C3EF62}" type="datetimeFigureOut">
               <a:rPr lang="en-US" smtClean="0"/>
-              <a:t>4/30/16</a:t>
+              <a:t>9/18/16</a:t>
             </a:fld>
             <a:endParaRPr lang="en-US"/>
           </a:p>
@@ -2536,7 +2538,7 @@
           <a:p>
             <a:fld id="{1DBA729F-FDA9-7448-91B8-071AA2C3EF62}" type="datetimeFigureOut">
               <a:rPr lang="en-US" smtClean="0"/>
-              <a:t>4/30/16</a:t>
+              <a:t>9/18/16</a:t>
             </a:fld>
             <a:endParaRPr lang="en-US"/>
           </a:p>
@@ -2789,7 +2791,7 @@
           <a:p>
             <a:fld id="{1DBA729F-FDA9-7448-91B8-071AA2C3EF62}" type="datetimeFigureOut">
               <a:rPr lang="en-US" smtClean="0"/>
-              <a:t>4/30/16</a:t>
+              <a:t>9/18/16</a:t>
             </a:fld>
             <a:endParaRPr lang="en-US"/>
           </a:p>
@@ -3002,7 +3004,7 @@
           <a:p>
             <a:fld id="{1DBA729F-FDA9-7448-91B8-071AA2C3EF62}" type="datetimeFigureOut">
               <a:rPr lang="en-US" smtClean="0"/>
-              <a:t>4/30/16</a:t>
+              <a:t>9/18/16</a:t>
             </a:fld>
             <a:endParaRPr lang="en-US"/>
           </a:p>
@@ -3393,24 +3395,6 @@
 <file path=ppt/slides/slide1.xml><?xml version="1.0" encoding="utf-8"?>
 <p:sld xmlns:a="http://schemas.openxmlformats.org/drawingml/2006/main" xmlns:r="http://schemas.openxmlformats.org/officeDocument/2006/relationships" xmlns:p="http://schemas.openxmlformats.org/presentationml/2006/main">
   <p:cSld>
-    <p:bg>
-      <p:bgPr>
-        <a:gradFill>
-          <a:gsLst>
-            <a:gs pos="84000">
-              <a:schemeClr val="accent1"/>
-            </a:gs>
-            <a:gs pos="49000">
-              <a:schemeClr val="accent1">
-                <a:lumMod val="75000"/>
-              </a:schemeClr>
-            </a:gs>
-          </a:gsLst>
-          <a:lin ang="5400000" scaled="1"/>
-        </a:gradFill>
-        <a:effectLst/>
-      </p:bgPr>
-    </p:bg>
     <p:spTree>
       <p:nvGrpSpPr>
         <p:cNvPr id="1" name=""/>
@@ -4281,7 +4265,7 @@
                   <a:schemeClr val="bg1"/>
                 </a:solidFill>
               </a:rPr>
-              <a:t>Send to Display </a:t>
+              <a:t>Send to </a:t>
             </a:r>
             <a:r>
               <a:rPr lang="en-US" sz="1600" dirty="0" smtClean="0">
@@ -4289,7 +4273,7 @@
                   <a:schemeClr val="bg1"/>
                 </a:solidFill>
               </a:rPr>
-              <a:t>Feedback</a:t>
+              <a:t>Feedback Display</a:t>
             </a:r>
             <a:endParaRPr lang="en-US" sz="1600" dirty="0">
               <a:solidFill>
@@ -7632,21 +7616,190 @@
 <file path=ppt/slides/slide2.xml><?xml version="1.0" encoding="utf-8"?>
 <p:sld xmlns:a="http://schemas.openxmlformats.org/drawingml/2006/main" xmlns:r="http://schemas.openxmlformats.org/officeDocument/2006/relationships" xmlns:p="http://schemas.openxmlformats.org/presentationml/2006/main">
   <p:cSld>
+    <p:spTree>
+      <p:nvGrpSpPr>
+        <p:cNvPr id="1" name=""/>
+        <p:cNvGrpSpPr/>
+        <p:nvPr/>
+      </p:nvGrpSpPr>
+      <p:grpSpPr>
+        <a:xfrm>
+          <a:off x="0" y="0"/>
+          <a:ext cx="0" cy="0"/>
+          <a:chOff x="0" y="0"/>
+          <a:chExt cx="0" cy="0"/>
+        </a:xfrm>
+      </p:grpSpPr>
+      <p:pic>
+        <p:nvPicPr>
+          <p:cNvPr id="2" name="Picture 1"/>
+          <p:cNvPicPr>
+            <a:picLocks noChangeAspect="1"/>
+          </p:cNvPicPr>
+          <p:nvPr/>
+        </p:nvPicPr>
+        <p:blipFill rotWithShape="1">
+          <a:blip r:embed="rId2"/>
+          <a:srcRect l="458" t="16635" r="741" b="571"/>
+          <a:stretch/>
+        </p:blipFill>
+        <p:spPr>
+          <a:xfrm>
+            <a:off x="2562534" y="1166949"/>
+            <a:ext cx="7542917" cy="5682346"/>
+          </a:xfrm>
+          <a:prstGeom prst="rect">
+            <a:avLst/>
+          </a:prstGeom>
+        </p:spPr>
+      </p:pic>
+      <p:sp>
+        <p:nvSpPr>
+          <p:cNvPr id="3" name="Rectangle 2"/>
+          <p:cNvSpPr/>
+          <p:nvPr/>
+        </p:nvSpPr>
+        <p:spPr>
+          <a:xfrm>
+            <a:off x="290650" y="520618"/>
+            <a:ext cx="6911379" cy="646331"/>
+          </a:xfrm>
+          <a:prstGeom prst="rect">
+            <a:avLst/>
+          </a:prstGeom>
+          <a:noFill/>
+        </p:spPr>
+        <p:txBody>
+          <a:bodyPr wrap="none" lIns="91440" tIns="45720" rIns="91440" bIns="45720">
+            <a:spAutoFit/>
+          </a:bodyPr>
+          <a:lstStyle/>
+          <a:p>
+            <a:pPr algn="ctr"/>
+            <a:r>
+              <a:rPr lang="en-US" sz="3600" b="0" cap="none" spc="0" dirty="0" smtClean="0">
+                <a:ln w="0"/>
+                <a:solidFill>
+                  <a:schemeClr val="tx1"/>
+                </a:solidFill>
+                <a:effectLst>
+                  <a:outerShdw blurRad="38100" dist="19050" dir="2700000" algn="tl" rotWithShape="0">
+                    <a:schemeClr val="dk1">
+                      <a:alpha val="40000"/>
+                    </a:schemeClr>
+                  </a:outerShdw>
+                </a:effectLst>
+              </a:rPr>
+              <a:t>Test – Flexion of Body at 30 Degrees</a:t>
+            </a:r>
+            <a:endParaRPr lang="en-US" sz="3600" b="0" cap="none" spc="0" dirty="0">
+              <a:ln w="0"/>
+              <a:solidFill>
+                <a:schemeClr val="tx1"/>
+              </a:solidFill>
+              <a:effectLst>
+                <a:outerShdw blurRad="38100" dist="19050" dir="2700000" algn="tl" rotWithShape="0">
+                  <a:schemeClr val="dk1">
+                    <a:alpha val="40000"/>
+                  </a:schemeClr>
+                </a:outerShdw>
+              </a:effectLst>
+            </a:endParaRPr>
+          </a:p>
+        </p:txBody>
+      </p:sp>
+      <p:sp>
+        <p:nvSpPr>
+          <p:cNvPr id="4" name="Rectangle 3"/>
+          <p:cNvSpPr/>
+          <p:nvPr/>
+        </p:nvSpPr>
+        <p:spPr>
+          <a:xfrm>
+            <a:off x="290650" y="5120730"/>
+            <a:ext cx="2463063" cy="1200329"/>
+          </a:xfrm>
+          <a:prstGeom prst="rect">
+            <a:avLst/>
+          </a:prstGeom>
+          <a:noFill/>
+        </p:spPr>
+        <p:txBody>
+          <a:bodyPr wrap="square" lIns="91440" tIns="45720" rIns="91440" bIns="45720">
+            <a:spAutoFit/>
+          </a:bodyPr>
+          <a:lstStyle/>
+          <a:p>
+            <a:pPr algn="ctr"/>
+            <a:r>
+              <a:rPr lang="en-US" sz="3600" b="0" cap="none" spc="0" dirty="0" smtClean="0">
+                <a:ln w="0"/>
+                <a:solidFill>
+                  <a:schemeClr val="tx1"/>
+                </a:solidFill>
+                <a:effectLst>
+                  <a:outerShdw blurRad="38100" dist="19050" dir="2700000" algn="tl" rotWithShape="0">
+                    <a:schemeClr val="dk1">
+                      <a:alpha val="40000"/>
+                    </a:schemeClr>
+                  </a:outerShdw>
+                </a:effectLst>
+              </a:rPr>
+              <a:t>2 – Tracked</a:t>
+            </a:r>
+          </a:p>
+          <a:p>
+            <a:pPr algn="ctr"/>
+            <a:r>
+              <a:rPr lang="en-US" sz="3600" dirty="0" smtClean="0">
+                <a:ln w="0"/>
+                <a:effectLst>
+                  <a:outerShdw blurRad="38100" dist="19050" dir="2700000" algn="tl" rotWithShape="0">
+                    <a:schemeClr val="dk1">
+                      <a:alpha val="40000"/>
+                    </a:schemeClr>
+                  </a:outerShdw>
+                </a:effectLst>
+              </a:rPr>
+              <a:t>1 - Inferred</a:t>
+            </a:r>
+            <a:endParaRPr lang="en-US" sz="3600" b="0" cap="none" spc="0" dirty="0">
+              <a:ln w="0"/>
+              <a:solidFill>
+                <a:schemeClr val="tx1"/>
+              </a:solidFill>
+              <a:effectLst>
+                <a:outerShdw blurRad="38100" dist="19050" dir="2700000" algn="tl" rotWithShape="0">
+                  <a:schemeClr val="dk1">
+                    <a:alpha val="40000"/>
+                  </a:schemeClr>
+                </a:outerShdw>
+              </a:effectLst>
+            </a:endParaRPr>
+          </a:p>
+        </p:txBody>
+      </p:sp>
+    </p:spTree>
+    <p:extLst>
+      <p:ext uri="{BB962C8B-B14F-4D97-AF65-F5344CB8AC3E}">
+        <p14:creationId xmlns:p14="http://schemas.microsoft.com/office/powerpoint/2010/main" val="1482532709"/>
+      </p:ext>
+    </p:extLst>
+  </p:cSld>
+  <p:clrMapOvr>
+    <a:masterClrMapping/>
+  </p:clrMapOvr>
+</p:sld>
+</file>
+
+<file path=ppt/slides/slide3.xml><?xml version="1.0" encoding="utf-8"?>
+<p:sld xmlns:a="http://schemas.openxmlformats.org/drawingml/2006/main" xmlns:r="http://schemas.openxmlformats.org/officeDocument/2006/relationships" xmlns:p="http://schemas.openxmlformats.org/presentationml/2006/main">
+  <p:cSld>
     <p:bg>
       <p:bgPr>
-        <a:gradFill>
-          <a:gsLst>
-            <a:gs pos="84000">
-              <a:schemeClr val="accent1"/>
-            </a:gs>
-            <a:gs pos="49000">
-              <a:schemeClr val="accent1">
-                <a:lumMod val="75000"/>
-              </a:schemeClr>
-            </a:gs>
-          </a:gsLst>
-          <a:lin ang="5400000" scaled="1"/>
-        </a:gradFill>
+        <a:solidFill>
+          <a:schemeClr val="bg1"/>
+        </a:solidFill>
         <a:effectLst/>
       </p:bgPr>
     </p:bg>
@@ -9710,8 +9863,8 @@
         </p:nvSpPr>
         <p:spPr>
           <a:xfrm>
-            <a:off x="76783" y="1449730"/>
-            <a:ext cx="5364802" cy="646331"/>
+            <a:off x="101343" y="1449730"/>
+            <a:ext cx="5315686" cy="646331"/>
           </a:xfrm>
           <a:prstGeom prst="rect">
             <a:avLst/>
@@ -9726,7 +9879,7 @@
           <a:p>
             <a:pPr algn="ctr"/>
             <a:r>
-              <a:rPr lang="en-US" sz="3600" dirty="0" smtClean="0">
+              <a:rPr lang="en-US" sz="3600" smtClean="0">
                 <a:ln w="0"/>
                 <a:effectLst>
                   <a:outerShdw blurRad="38100" dist="19050" dir="2700000" algn="tl" rotWithShape="0">
@@ -9736,7 +9889,7 @@
                   </a:outerShdw>
                 </a:effectLst>
               </a:rPr>
-              <a:t>Display Feedback Flowchart</a:t>
+              <a:t>Feedback Display Flowchart</a:t>
             </a:r>
             <a:endParaRPr lang="en-US" sz="3600" b="0" cap="none" spc="0" dirty="0">
               <a:ln w="0"/>
@@ -10116,6 +10269,151 @@
     <p:extLst>
       <p:ext uri="{BB962C8B-B14F-4D97-AF65-F5344CB8AC3E}">
         <p14:creationId xmlns:p14="http://schemas.microsoft.com/office/powerpoint/2010/main" val="772513849"/>
+      </p:ext>
+    </p:extLst>
+  </p:cSld>
+  <p:clrMapOvr>
+    <a:masterClrMapping/>
+  </p:clrMapOvr>
+</p:sld>
+</file>
+
+<file path=ppt/slides/slide4.xml><?xml version="1.0" encoding="utf-8"?>
+<p:sld xmlns:a="http://schemas.openxmlformats.org/drawingml/2006/main" xmlns:r="http://schemas.openxmlformats.org/officeDocument/2006/relationships" xmlns:p="http://schemas.openxmlformats.org/presentationml/2006/main">
+  <p:cSld>
+    <p:spTree>
+      <p:nvGrpSpPr>
+        <p:cNvPr id="1" name=""/>
+        <p:cNvGrpSpPr/>
+        <p:nvPr/>
+      </p:nvGrpSpPr>
+      <p:grpSpPr>
+        <a:xfrm>
+          <a:off x="0" y="0"/>
+          <a:ext cx="0" cy="0"/>
+          <a:chOff x="0" y="0"/>
+          <a:chExt cx="0" cy="0"/>
+        </a:xfrm>
+      </p:grpSpPr>
+      <p:pic>
+        <p:nvPicPr>
+          <p:cNvPr id="1028" name="Picture 4" descr="https://lh6.googleusercontent.com/nkdOJLxzeiNhYy-KUd9tLsWO05Z342ZMrGHZmjOYGmVjKvhD07xCOBehzQgoZO8CK-_ZeaqW5OlLpNcUUy_DN99WuUPZTes48kJMcaYVhbesqxjtAfMzBezobK13UwpcMjwsSsBTdnI"/>
+          <p:cNvPicPr>
+            <a:picLocks noChangeAspect="1" noChangeArrowheads="1"/>
+          </p:cNvPicPr>
+          <p:nvPr/>
+        </p:nvPicPr>
+        <p:blipFill>
+          <a:blip r:embed="rId2">
+            <a:extLst>
+              <a:ext uri="{28A0092B-C50C-407E-A947-70E740481C1C}">
+                <a14:useLocalDpi xmlns:a14="http://schemas.microsoft.com/office/drawing/2010/main" val="0"/>
+              </a:ext>
+            </a:extLst>
+          </a:blip>
+          <a:srcRect/>
+          <a:stretch>
+            <a:fillRect/>
+          </a:stretch>
+        </p:blipFill>
+        <p:spPr bwMode="auto">
+          <a:xfrm>
+            <a:off x="0" y="0"/>
+            <a:ext cx="12192000" cy="6858000"/>
+          </a:xfrm>
+          <a:prstGeom prst="rect">
+            <a:avLst/>
+          </a:prstGeom>
+          <a:noFill/>
+          <a:extLst>
+            <a:ext uri="{909E8E84-426E-40DD-AFC4-6F175D3DCCD1}">
+              <a14:hiddenFill xmlns:a14="http://schemas.microsoft.com/office/drawing/2010/main">
+                <a:solidFill>
+                  <a:srgbClr val="FFFFFF"/>
+                </a:solidFill>
+              </a14:hiddenFill>
+            </a:ext>
+          </a:extLst>
+        </p:spPr>
+      </p:pic>
+      <p:sp>
+        <p:nvSpPr>
+          <p:cNvPr id="3" name="Rectangle 2"/>
+          <p:cNvSpPr/>
+          <p:nvPr/>
+        </p:nvSpPr>
+        <p:spPr>
+          <a:xfrm>
+            <a:off x="5977217" y="3244334"/>
+            <a:ext cx="237566" cy="369332"/>
+          </a:xfrm>
+          <a:prstGeom prst="rect">
+            <a:avLst/>
+          </a:prstGeom>
+        </p:spPr>
+        <p:txBody>
+          <a:bodyPr wrap="none">
+            <a:spAutoFit/>
+          </a:bodyPr>
+          <a:lstStyle/>
+          <a:p>
+            <a:r>
+              <a:rPr lang="en-US" dirty="0"/>
+              <a:t> </a:t>
+            </a:r>
+          </a:p>
+        </p:txBody>
+      </p:sp>
+      <p:sp>
+        <p:nvSpPr>
+          <p:cNvPr id="4" name="Rectangle 3"/>
+          <p:cNvSpPr/>
+          <p:nvPr/>
+        </p:nvSpPr>
+        <p:spPr>
+          <a:xfrm>
+            <a:off x="26127" y="1097280"/>
+            <a:ext cx="1776549" cy="2882537"/>
+          </a:xfrm>
+          <a:prstGeom prst="rect">
+            <a:avLst/>
+          </a:prstGeom>
+          <a:noFill/>
+          <a:ln w="57150">
+            <a:solidFill>
+              <a:srgbClr val="FF0000"/>
+            </a:solidFill>
+          </a:ln>
+        </p:spPr>
+        <p:style>
+          <a:lnRef idx="2">
+            <a:schemeClr val="accent1">
+              <a:shade val="50000"/>
+            </a:schemeClr>
+          </a:lnRef>
+          <a:fillRef idx="1">
+            <a:schemeClr val="accent1"/>
+          </a:fillRef>
+          <a:effectRef idx="0">
+            <a:schemeClr val="accent1"/>
+          </a:effectRef>
+          <a:fontRef idx="minor">
+            <a:schemeClr val="lt1"/>
+          </a:fontRef>
+        </p:style>
+        <p:txBody>
+          <a:bodyPr rtlCol="0" anchor="ctr"/>
+          <a:lstStyle/>
+          <a:p>
+            <a:pPr algn="ctr"/>
+            <a:endParaRPr lang="en-US"/>
+          </a:p>
+        </p:txBody>
+      </p:sp>
+    </p:spTree>
+    <p:extLst>
+      <p:ext uri="{BB962C8B-B14F-4D97-AF65-F5344CB8AC3E}">
+        <p14:creationId xmlns:p14="http://schemas.microsoft.com/office/powerpoint/2010/main" val="780911734"/>
       </p:ext>
     </p:extLst>
   </p:cSld>

</xml_diff>